<commit_message>
Changed Conclusions to Conclusion
</commit_message>
<xml_diff>
--- a/COPA Project Poster - Group 6 - FINAL.pptx
+++ b/COPA Project Poster - Group 6 - FINAL.pptx
@@ -2943,7 +2943,7 @@
               <a:rPr lang="en-US" sz="4000" b="1" dirty="0">
                 <a:latin typeface="Calibri" pitchFamily="34" charset="0"/>
               </a:rPr>
-              <a:t>CONCLUSIONS</a:t>
+              <a:t>CONCLUSION</a:t>
             </a:r>
           </a:p>
         </p:txBody>
@@ -5479,8 +5479,8 @@
         </p:blipFill>
         <p:spPr>
           <a:xfrm>
-            <a:off x="24047107" y="4267199"/>
-            <a:ext cx="8369620" cy="6852761"/>
+            <a:off x="24047107" y="4266297"/>
+            <a:ext cx="8369620" cy="6853664"/>
           </a:xfrm>
           <a:prstGeom prst="rect">
             <a:avLst/>

</xml_diff>